<commit_message>
shell file to download pretrained models
</commit_message>
<xml_diff>
--- a/presentation/Final_PPT.pptx
+++ b/presentation/Final_PPT.pptx
@@ -1227,7 +1227,7 @@
         </p:nvSpPr>
         <p:spPr>
           <a:xfrm>
-            <a:off x="381300" y="685800"/>
+            <a:off x="381000" y="685800"/>
             <a:ext cx="6096000" cy="3429000"/>
           </a:xfrm>
           <a:custGeom>
@@ -1280,6 +1280,261 @@
             <a:noAutofit/>
           </a:bodyPr>
           <a:lstStyle/>
+          <a:p>
+            <a:pPr marL="0" lvl="0" indent="0" algn="l" rtl="0">
+              <a:spcBef>
+                <a:spcPts val="0"/>
+              </a:spcBef>
+              <a:spcAft>
+                <a:spcPts val="0"/>
+              </a:spcAft>
+              <a:buNone/>
+            </a:pPr>
+            <a:r>
+              <a:rPr lang="en-US" dirty="0"/>
+              <a:t>Combination of both these is the proposed architecture.</a:t>
+            </a:r>
+          </a:p>
+          <a:p>
+            <a:pPr marL="0" lvl="0" indent="0" algn="l" rtl="0">
+              <a:spcBef>
+                <a:spcPts val="0"/>
+              </a:spcBef>
+              <a:spcAft>
+                <a:spcPts val="0"/>
+              </a:spcAft>
+              <a:buNone/>
+            </a:pPr>
+            <a:r>
+              <a:rPr lang="en-US" dirty="0"/>
+              <a:t>Start </a:t>
+            </a:r>
+          </a:p>
+          <a:p>
+            <a:pPr marL="0" lvl="0" indent="0" algn="l" rtl="0">
+              <a:spcBef>
+                <a:spcPts val="0"/>
+              </a:spcBef>
+              <a:spcAft>
+                <a:spcPts val="0"/>
+              </a:spcAft>
+              <a:buNone/>
+            </a:pPr>
+            <a:r>
+              <a:rPr lang="en-US" dirty="0"/>
+              <a:t>Target was to get domain specific rich  medical image embedding</a:t>
+            </a:r>
+          </a:p>
+          <a:p>
+            <a:pPr marL="0" lvl="0" indent="0" algn="l" rtl="0">
+              <a:spcBef>
+                <a:spcPts val="0"/>
+              </a:spcBef>
+              <a:spcAft>
+                <a:spcPts val="0"/>
+              </a:spcAft>
+              <a:buNone/>
+            </a:pPr>
+            <a:r>
+              <a:rPr lang="en-US" dirty="0"/>
+              <a:t>For text encoder -&gt; </a:t>
+            </a:r>
+          </a:p>
+          <a:p>
+            <a:pPr marL="0" lvl="0" indent="0" algn="l" rtl="0">
+              <a:spcBef>
+                <a:spcPts val="0"/>
+              </a:spcBef>
+              <a:spcAft>
+                <a:spcPts val="0"/>
+              </a:spcAft>
+              <a:buNone/>
+            </a:pPr>
+            <a:r>
+              <a:rPr lang="en-US" dirty="0"/>
+              <a:t>1) Auto tokenizer </a:t>
+            </a:r>
+          </a:p>
+          <a:p>
+            <a:pPr marL="0" lvl="0" indent="0" algn="l" rtl="0">
+              <a:spcBef>
+                <a:spcPts val="0"/>
+              </a:spcBef>
+              <a:spcAft>
+                <a:spcPts val="0"/>
+              </a:spcAft>
+              <a:buNone/>
+            </a:pPr>
+            <a:r>
+              <a:rPr lang="en-US" dirty="0"/>
+              <a:t>2) Question encoding </a:t>
+            </a:r>
+          </a:p>
+          <a:p>
+            <a:pPr marL="0" lvl="0" indent="0" algn="l" rtl="0">
+              <a:spcBef>
+                <a:spcPts val="0"/>
+              </a:spcBef>
+              <a:spcAft>
+                <a:spcPts val="0"/>
+              </a:spcAft>
+              <a:buNone/>
+            </a:pPr>
+            <a:endParaRPr lang="en-US" dirty="0"/>
+          </a:p>
+          <a:p>
+            <a:pPr marL="0" lvl="0" indent="0" algn="l" rtl="0">
+              <a:spcBef>
+                <a:spcPts val="0"/>
+              </a:spcBef>
+              <a:spcAft>
+                <a:spcPts val="0"/>
+              </a:spcAft>
+              <a:buNone/>
+            </a:pPr>
+            <a:r>
+              <a:rPr lang="en-US" dirty="0"/>
+              <a:t>Fusion </a:t>
+            </a:r>
+          </a:p>
+          <a:p>
+            <a:pPr marL="0" lvl="0" indent="0" algn="l" rtl="0">
+              <a:spcBef>
+                <a:spcPts val="0"/>
+              </a:spcBef>
+              <a:spcAft>
+                <a:spcPts val="0"/>
+              </a:spcAft>
+              <a:buNone/>
+            </a:pPr>
+            <a:r>
+              <a:rPr lang="en-US" dirty="0"/>
+              <a:t>Vision transformer -&gt; each image is resized 384 * 384  </a:t>
+            </a:r>
+          </a:p>
+          <a:p>
+            <a:pPr marL="0" lvl="0" indent="0" algn="l" rtl="0">
+              <a:spcBef>
+                <a:spcPts val="0"/>
+              </a:spcBef>
+              <a:spcAft>
+                <a:spcPts val="0"/>
+              </a:spcAft>
+              <a:buNone/>
+            </a:pPr>
+            <a:r>
+              <a:rPr lang="en-US" dirty="0"/>
+              <a:t>With the kernel size of 16 and stride of 16 -&gt; we will result in 24*24 features </a:t>
+            </a:r>
+            <a:r>
+              <a:rPr lang="en-US" dirty="0" err="1"/>
+              <a:t>i.e</a:t>
+            </a:r>
+            <a:r>
+              <a:rPr lang="en-US" dirty="0"/>
+              <a:t>  576   after attaching a positional embedding at the start we get the patch wise embedding from vision encoder of size (Batch, 577,768)</a:t>
+            </a:r>
+          </a:p>
+          <a:p>
+            <a:pPr marL="0" lvl="0" indent="0" algn="l" rtl="0">
+              <a:spcBef>
+                <a:spcPts val="0"/>
+              </a:spcBef>
+              <a:spcAft>
+                <a:spcPts val="0"/>
+              </a:spcAft>
+              <a:buNone/>
+            </a:pPr>
+            <a:r>
+              <a:rPr lang="en-US" dirty="0"/>
+              <a:t>To make the text encoding of the same size we keep question seq size as 577 and </a:t>
+            </a:r>
+            <a:r>
+              <a:rPr lang="en-US" dirty="0" err="1"/>
+              <a:t>d_model</a:t>
+            </a:r>
+            <a:r>
+              <a:rPr lang="en-US" dirty="0"/>
+              <a:t> as 768 .</a:t>
+            </a:r>
+          </a:p>
+          <a:p>
+            <a:pPr marL="0" lvl="0" indent="0" algn="l" rtl="0">
+              <a:spcBef>
+                <a:spcPts val="0"/>
+              </a:spcBef>
+              <a:spcAft>
+                <a:spcPts val="0"/>
+              </a:spcAft>
+              <a:buNone/>
+            </a:pPr>
+            <a:r>
+              <a:rPr lang="en-US" dirty="0"/>
+              <a:t>For vocabulary </a:t>
+            </a:r>
+          </a:p>
+          <a:p>
+            <a:pPr marL="0" lvl="0" indent="0" algn="l" rtl="0">
+              <a:spcBef>
+                <a:spcPts val="0"/>
+              </a:spcBef>
+              <a:spcAft>
+                <a:spcPts val="0"/>
+              </a:spcAft>
+              <a:buNone/>
+            </a:pPr>
+            <a:r>
+              <a:rPr lang="en-US" dirty="0"/>
+              <a:t>We tried to create our own </a:t>
+            </a:r>
+            <a:r>
+              <a:rPr lang="en-US" dirty="0" err="1"/>
+              <a:t>subword</a:t>
+            </a:r>
+            <a:r>
+              <a:rPr lang="en-US" dirty="0"/>
+              <a:t> tokenizer and vocabulary using the train dataset available.</a:t>
+            </a:r>
+          </a:p>
+          <a:p>
+            <a:pPr marL="0" lvl="0" indent="0" algn="l" rtl="0">
+              <a:spcBef>
+                <a:spcPts val="0"/>
+              </a:spcBef>
+              <a:spcAft>
+                <a:spcPts val="0"/>
+              </a:spcAft>
+              <a:buNone/>
+            </a:pPr>
+            <a:endParaRPr lang="en-US" dirty="0"/>
+          </a:p>
+          <a:p>
+            <a:pPr marL="0" lvl="0" indent="0" algn="l" rtl="0">
+              <a:spcBef>
+                <a:spcPts val="0"/>
+              </a:spcBef>
+              <a:spcAft>
+                <a:spcPts val="0"/>
+              </a:spcAft>
+              <a:buNone/>
+            </a:pPr>
+            <a:r>
+              <a:rPr lang="en-US" dirty="0"/>
+              <a:t>The concatenated </a:t>
+            </a:r>
+            <a:r>
+              <a:rPr lang="en-US" dirty="0" err="1"/>
+              <a:t>embedddng</a:t>
+            </a:r>
+            <a:r>
+              <a:rPr lang="en-US" dirty="0"/>
+              <a:t> would be (Batch, 577, 768*2 ). </a:t>
+            </a:r>
+            <a:r>
+              <a:rPr lang="en-US"/>
+              <a:t>We then </a:t>
+            </a:r>
+          </a:p>
           <a:p>
             <a:pPr marL="0" lvl="0" indent="0" algn="l" rtl="0">
               <a:spcBef>
@@ -3075,7 +3330,7 @@
         </p:nvSpPr>
         <p:spPr>
           <a:xfrm>
-            <a:off x="381300" y="685800"/>
+            <a:off x="381000" y="685800"/>
             <a:ext cx="6096000" cy="3429000"/>
           </a:xfrm>
           <a:custGeom>
@@ -3129,6 +3384,48 @@
           </a:bodyPr>
           <a:lstStyle/>
           <a:p>
+            <a:pPr marL="0" marR="0" algn="just">
+              <a:lnSpc>
+                <a:spcPct val="115000"/>
+              </a:lnSpc>
+              <a:spcBef>
+                <a:spcPts val="0"/>
+              </a:spcBef>
+              <a:spcAft>
+                <a:spcPts val="0"/>
+              </a:spcAft>
+            </a:pPr>
+            <a:r>
+              <a:rPr lang="en-US" sz="1800" dirty="0">
+                <a:effectLst/>
+                <a:latin typeface="Arial" panose="020B0604020202020204" pitchFamily="34" charset="0"/>
+                <a:ea typeface="Arial" panose="020B0604020202020204" pitchFamily="34" charset="0"/>
+              </a:rPr>
+              <a:t>After consolidating the datasets, our combined corpus comprises 14,590 question-answer pairs in the training set, 2,000 pairs in the validation set, and 500 pairs in the test set.</a:t>
+            </a:r>
+          </a:p>
+          <a:p>
+            <a:pPr marL="0" marR="0" algn="just">
+              <a:lnSpc>
+                <a:spcPct val="115000"/>
+              </a:lnSpc>
+              <a:spcBef>
+                <a:spcPts val="0"/>
+              </a:spcBef>
+              <a:spcAft>
+                <a:spcPts val="0"/>
+              </a:spcAft>
+            </a:pPr>
+            <a:r>
+              <a:rPr lang="en-US" sz="1800" dirty="0">
+                <a:effectLst/>
+                <a:latin typeface="Arial" panose="020B0604020202020204" pitchFamily="34" charset="0"/>
+                <a:ea typeface="Arial" panose="020B0604020202020204" pitchFamily="34" charset="0"/>
+              </a:rPr>
+              <a:t> </a:t>
+            </a:r>
+          </a:p>
+          <a:p>
             <a:pPr marL="0" lvl="0" indent="0" algn="l" rtl="0">
               <a:spcBef>
                 <a:spcPts val="0"/>
@@ -3138,7 +3435,7 @@
               </a:spcAft>
               <a:buNone/>
             </a:pPr>
-            <a:endParaRPr/>
+            <a:endParaRPr dirty="0"/>
           </a:p>
         </p:txBody>
       </p:sp>
@@ -3346,7 +3643,7 @@
               </a:spcAft>
               <a:buNone/>
             </a:pPr>
-            <a:endParaRPr/>
+            <a:endParaRPr dirty="0"/>
           </a:p>
         </p:txBody>
       </p:sp>
@@ -12984,7 +13281,7 @@
                         </a:spcAft>
                       </a:pPr>
                       <a:r>
-                        <a:rPr lang="en-US" sz="1100">
+                        <a:rPr lang="en-US" sz="1100" dirty="0">
                           <a:solidFill>
                             <a:schemeClr val="tx2">
                               <a:lumMod val="10000"/>
@@ -13349,12 +13646,36 @@
               <a:t>3. Convolution Fine-tuned BLIP: </a:t>
             </a:r>
             <a:r>
-              <a:rPr lang="en" dirty="0">
+              <a:rPr lang="en-US" dirty="0" err="1">
                 <a:solidFill>
-                  <a:srgbClr val="FF0000"/>
+                  <a:srgbClr val="00B050"/>
                 </a:solidFill>
               </a:rPr>
-              <a:t>arteriovenous malform</a:t>
+              <a:t>cta</a:t>
+            </a:r>
+            <a:r>
+              <a:rPr lang="en-US" dirty="0">
+                <a:solidFill>
+                  <a:srgbClr val="00B050"/>
+                </a:solidFill>
+              </a:rPr>
+              <a:t> - </a:t>
+            </a:r>
+            <a:r>
+              <a:rPr lang="en-US" dirty="0" err="1">
+                <a:solidFill>
+                  <a:srgbClr val="00B050"/>
+                </a:solidFill>
+              </a:rPr>
+              <a:t>ct</a:t>
+            </a:r>
+            <a:r>
+              <a:rPr lang="en-US" dirty="0">
+                <a:solidFill>
+                  <a:srgbClr val="00B050"/>
+                </a:solidFill>
+              </a:rPr>
+              <a:t> angiography</a:t>
             </a:r>
             <a:br>
               <a:rPr lang="en" dirty="0"/>
@@ -14005,10 +14326,10 @@
             <a:r>
               <a:rPr lang="en" dirty="0">
                 <a:solidFill>
-                  <a:srgbClr val="FF0000"/>
+                  <a:srgbClr val="00B050"/>
                 </a:solidFill>
               </a:rPr>
-              <a:t>sagittal</a:t>
+              <a:t>yes</a:t>
             </a:r>
             <a:br>
               <a:rPr lang="en" dirty="0"/>

</xml_diff>